<commit_message>
v 1.0.0 packagedown built
</commit_message>
<xml_diff>
--- a/vignettes/Output_default.pptx
+++ b/vignettes/Output_default.pptx
@@ -3747,7 +3747,7 @@
                 <a:ea typeface="Arial"/>
                 <a:sym typeface="Arial"/>
               </a:rPr>
-              <a:t>\\pfs1w\C:\Users\kheal579\Documents\01_integral-private\integral-private\vignettes\C:\Users\kheal579\AppData\Local\Temp\RtmpWuRGVr\callr-scr-74041513d19 2022-08-15 J. Doe</a:t>
+              <a:t>\\pfs1w\C:\Users\kheal579\Documents\01_integral-private\integral-private\vignettes\C:\Users\kheal579\AppData\Local\Temp\Rtmp2nWN2H\callr-scr-99a4a6123d3 2022-08-24 J. Doe</a:t>
             </a:r>
           </a:p>
         </p:txBody>
@@ -4039,7 +4039,7 @@
                 <a:ea typeface="Arial"/>
                 <a:sym typeface="Arial"/>
               </a:rPr>
-              <a:t>\\pfs1w\C:\Users\kheal579\Documents\01_integral-private\integral-private\vignettes\C:\Users\kheal579\AppData\Local\Temp\RtmpWuRGVr\callr-scr-74041513d19 2022-08-15 J. Doe</a:t>
+              <a:t>\\pfs1w\C:\Users\kheal579\Documents\01_integral-private\integral-private\vignettes\C:\Users\kheal579\AppData\Local\Temp\Rtmp2nWN2H\callr-scr-99a4a6123d3 2022-08-24 J. Doe</a:t>
             </a:r>
           </a:p>
         </p:txBody>

</xml_diff>

<commit_message>
commit just before changing name of repo
</commit_message>
<xml_diff>
--- a/vignettes/Output_default.pptx
+++ b/vignettes/Output_default.pptx
@@ -3747,7 +3747,7 @@
                 <a:ea typeface="Arial"/>
                 <a:sym typeface="Arial"/>
               </a:rPr>
-              <a:t>\\pfs1w\C:\Users\kheal579\Documents\01_integral-private\integral-private\vignettes\C:\Users\kheal579\AppData\Local\Temp\Rtmp2nWN2H\callr-scr-99a4a6123d3 2022-08-24 J. Doe</a:t>
+              <a:t>\\pfs1w\C:\Users\kheal579\Documents\01_integral-private\integral-private\vignettes\C:\Users\kheal579\AppData\Local\Temp\RtmpEzTRKa\callr-scr-94485bb46ca9 2022-08-24 J. Doe</a:t>
             </a:r>
           </a:p>
         </p:txBody>
@@ -4039,7 +4039,7 @@
                 <a:ea typeface="Arial"/>
                 <a:sym typeface="Arial"/>
               </a:rPr>
-              <a:t>\\pfs1w\C:\Users\kheal579\Documents\01_integral-private\integral-private\vignettes\C:\Users\kheal579\AppData\Local\Temp\Rtmp2nWN2H\callr-scr-99a4a6123d3 2022-08-24 J. Doe</a:t>
+              <a:t>\\pfs1w\C:\Users\kheal579\Documents\01_integral-private\integral-private\vignettes\C:\Users\kheal579\AppData\Local\Temp\RtmpEzTRKa\callr-scr-94485bb46ca9 2022-08-24 J. Doe</a:t>
             </a:r>
           </a:p>
         </p:txBody>

</xml_diff>